<commit_message>
modified diagram and created new png
</commit_message>
<xml_diff>
--- a/images/polygon_diagram.pptx
+++ b/images/polygon_diagram.pptx
@@ -224,7 +224,7 @@
           <a:p>
             <a:fld id="{49A7721D-1176-A640-AC48-B82F78C92D56}" type="datetimeFigureOut">
               <a:rPr lang="en-US" smtClean="0"/>
-              <a:t>8/15/22</a:t>
+              <a:t>1/12/2023</a:t>
             </a:fld>
             <a:endParaRPr lang="en-US" dirty="0"/>
           </a:p>
@@ -401,7 +401,7 @@
           <a:p>
             <a:fld id="{C884A089-FB25-6D46-9D21-F0F04A18BCA8}" type="datetimeFigureOut">
               <a:rPr lang="en-US" smtClean="0"/>
-              <a:t>8/15/22</a:t>
+              <a:t>1/12/2023</a:t>
             </a:fld>
             <a:endParaRPr lang="en-US" dirty="0"/>
           </a:p>
@@ -1036,7 +1036,7 @@
           <a:p>
             <a:fld id="{C764DE79-268F-4C1A-8933-263129D2AF90}" type="datetimeFigureOut">
               <a:rPr lang="en-US" dirty="0"/>
-              <a:t>8/15/22</a:t>
+              <a:t>1/12/2023</a:t>
             </a:fld>
             <a:endParaRPr lang="en-US" dirty="0"/>
           </a:p>
@@ -1207,7 +1207,7 @@
           <a:p>
             <a:fld id="{C764DE79-268F-4C1A-8933-263129D2AF90}" type="datetimeFigureOut">
               <a:rPr lang="en-US" dirty="0"/>
-              <a:t>8/15/22</a:t>
+              <a:t>1/12/2023</a:t>
             </a:fld>
             <a:endParaRPr lang="en-US" dirty="0"/>
           </a:p>
@@ -1388,7 +1388,7 @@
           <a:p>
             <a:fld id="{C764DE79-268F-4C1A-8933-263129D2AF90}" type="datetimeFigureOut">
               <a:rPr lang="en-US" dirty="0"/>
-              <a:t>8/15/22</a:t>
+              <a:t>1/12/2023</a:t>
             </a:fld>
             <a:endParaRPr lang="en-US" dirty="0"/>
           </a:p>
@@ -1581,7 +1581,7 @@
           <a:p>
             <a:fld id="{C764DE79-268F-4C1A-8933-263129D2AF90}" type="datetimeFigureOut">
               <a:rPr lang="en-US" dirty="0"/>
-              <a:t>8/15/22</a:t>
+              <a:t>1/12/2023</a:t>
             </a:fld>
             <a:endParaRPr lang="en-US" dirty="0"/>
           </a:p>
@@ -1752,7 +1752,7 @@
           <a:p>
             <a:fld id="{C764DE79-268F-4C1A-8933-263129D2AF90}" type="datetimeFigureOut">
               <a:rPr lang="en-US" dirty="0"/>
-              <a:t>8/15/22</a:t>
+              <a:t>1/12/2023</a:t>
             </a:fld>
             <a:endParaRPr lang="en-US" dirty="0"/>
           </a:p>
@@ -1997,7 +1997,7 @@
           <a:p>
             <a:fld id="{C764DE79-268F-4C1A-8933-263129D2AF90}" type="datetimeFigureOut">
               <a:rPr lang="en-US" dirty="0"/>
-              <a:t>8/15/22</a:t>
+              <a:t>1/12/2023</a:t>
             </a:fld>
             <a:endParaRPr lang="en-US" dirty="0"/>
           </a:p>
@@ -2230,7 +2230,7 @@
           <a:p>
             <a:fld id="{C764DE79-268F-4C1A-8933-263129D2AF90}" type="datetimeFigureOut">
               <a:rPr lang="en-US" dirty="0"/>
-              <a:t>8/15/22</a:t>
+              <a:t>1/12/2023</a:t>
             </a:fld>
             <a:endParaRPr lang="en-US" dirty="0"/>
           </a:p>
@@ -2598,7 +2598,7 @@
           <a:p>
             <a:fld id="{C764DE79-268F-4C1A-8933-263129D2AF90}" type="datetimeFigureOut">
               <a:rPr lang="en-US" dirty="0"/>
-              <a:t>8/15/22</a:t>
+              <a:t>1/12/2023</a:t>
             </a:fld>
             <a:endParaRPr lang="en-US" dirty="0"/>
           </a:p>
@@ -2717,7 +2717,7 @@
           <a:p>
             <a:fld id="{C764DE79-268F-4C1A-8933-263129D2AF90}" type="datetimeFigureOut">
               <a:rPr lang="en-US" dirty="0"/>
-              <a:t>8/15/22</a:t>
+              <a:t>1/12/2023</a:t>
             </a:fld>
             <a:endParaRPr lang="en-US" dirty="0"/>
           </a:p>
@@ -3086,7 +3086,7 @@
           <a:p>
             <a:fld id="{C764DE79-268F-4C1A-8933-263129D2AF90}" type="datetimeFigureOut">
               <a:rPr lang="en-US" dirty="0"/>
-              <a:t>8/15/22</a:t>
+              <a:t>1/12/2023</a:t>
             </a:fld>
             <a:endParaRPr lang="en-US" dirty="0"/>
           </a:p>
@@ -3620,7 +3620,7 @@
           <a:p>
             <a:fld id="{C764DE79-268F-4C1A-8933-263129D2AF90}" type="datetimeFigureOut">
               <a:rPr lang="en-US" dirty="0"/>
-              <a:t>8/15/22</a:t>
+              <a:t>1/12/2023</a:t>
             </a:fld>
             <a:endParaRPr lang="en-US" dirty="0"/>
           </a:p>
@@ -4028,6 +4028,73 @@
       </p:grpSpPr>
       <p:sp>
         <p:nvSpPr>
+          <p:cNvPr id="57" name="Rectangle 56">
+            <a:extLst>
+              <a:ext uri="{FF2B5EF4-FFF2-40B4-BE49-F238E27FC236}">
+                <a16:creationId xmlns:a16="http://schemas.microsoft.com/office/drawing/2014/main" id="{37703C61-09E8-4049-8248-F9AB232E14C1}"/>
+              </a:ext>
+            </a:extLst>
+          </p:cNvPr>
+          <p:cNvSpPr/>
+          <p:nvPr/>
+        </p:nvSpPr>
+        <p:spPr>
+          <a:xfrm>
+            <a:off x="1708426" y="1264763"/>
+            <a:ext cx="10007600" cy="3389533"/>
+          </a:xfrm>
+          <a:prstGeom prst="rect">
+            <a:avLst/>
+          </a:prstGeom>
+          <a:noFill/>
+          <a:ln w="12700">
+            <a:solidFill>
+              <a:srgbClr val="1E8900"/>
+            </a:solidFill>
+          </a:ln>
+        </p:spPr>
+        <p:style>
+          <a:lnRef idx="2">
+            <a:schemeClr val="accent1">
+              <a:shade val="50000"/>
+            </a:schemeClr>
+          </a:lnRef>
+          <a:fillRef idx="1">
+            <a:schemeClr val="accent1"/>
+          </a:fillRef>
+          <a:effectRef idx="0">
+            <a:schemeClr val="accent1"/>
+          </a:effectRef>
+          <a:fontRef idx="minor">
+            <a:schemeClr val="lt1"/>
+          </a:fontRef>
+        </p:style>
+        <p:txBody>
+          <a:bodyPr rot="0" spcFirstLastPara="0" vertOverflow="overflow" horzOverflow="overflow" vert="horz" wrap="square" lIns="457200" tIns="91440" rIns="91440" bIns="45720" numCol="1" spcCol="0" rtlCol="0" fromWordArt="0" anchor="t" anchorCtr="0" forceAA="0" compatLnSpc="1">
+            <a:prstTxWarp prst="textNoShape">
+              <a:avLst/>
+            </a:prstTxWarp>
+            <a:noAutofit/>
+          </a:bodyPr>
+          <a:lstStyle/>
+          <a:p>
+            <a:pPr algn="l"/>
+            <a:r>
+              <a:rPr lang="en-US" sz="1200" dirty="0">
+                <a:ln w="0"/>
+                <a:solidFill>
+                  <a:srgbClr val="1E8900"/>
+                </a:solidFill>
+                <a:latin typeface="Arial" panose="020B0604020202020204" pitchFamily="34" charset="0"/>
+                <a:cs typeface="Arial" panose="020B0604020202020204" pitchFamily="34" charset="0"/>
+              </a:rPr>
+              <a:t>VPC</a:t>
+            </a:r>
+          </a:p>
+        </p:txBody>
+      </p:sp>
+      <p:sp>
+        <p:nvSpPr>
           <p:cNvPr id="56" name="Rectangle 55">
             <a:extLst>
               <a:ext uri="{FF2B5EF4-FFF2-40B4-BE49-F238E27FC236}">
@@ -4097,73 +4164,6 @@
       </p:sp>
       <p:sp>
         <p:nvSpPr>
-          <p:cNvPr id="57" name="Rectangle 56">
-            <a:extLst>
-              <a:ext uri="{FF2B5EF4-FFF2-40B4-BE49-F238E27FC236}">
-                <a16:creationId xmlns:a16="http://schemas.microsoft.com/office/drawing/2014/main" id="{37703C61-09E8-4049-8248-F9AB232E14C1}"/>
-              </a:ext>
-            </a:extLst>
-          </p:cNvPr>
-          <p:cNvSpPr/>
-          <p:nvPr/>
-        </p:nvSpPr>
-        <p:spPr>
-          <a:xfrm>
-            <a:off x="1708426" y="1264763"/>
-            <a:ext cx="10007600" cy="3389533"/>
-          </a:xfrm>
-          <a:prstGeom prst="rect">
-            <a:avLst/>
-          </a:prstGeom>
-          <a:noFill/>
-          <a:ln w="12700">
-            <a:solidFill>
-              <a:srgbClr val="1E8900"/>
-            </a:solidFill>
-          </a:ln>
-        </p:spPr>
-        <p:style>
-          <a:lnRef idx="2">
-            <a:schemeClr val="accent1">
-              <a:shade val="50000"/>
-            </a:schemeClr>
-          </a:lnRef>
-          <a:fillRef idx="1">
-            <a:schemeClr val="accent1"/>
-          </a:fillRef>
-          <a:effectRef idx="0">
-            <a:schemeClr val="accent1"/>
-          </a:effectRef>
-          <a:fontRef idx="minor">
-            <a:schemeClr val="lt1"/>
-          </a:fontRef>
-        </p:style>
-        <p:txBody>
-          <a:bodyPr rot="0" spcFirstLastPara="0" vertOverflow="overflow" horzOverflow="overflow" vert="horz" wrap="square" lIns="457200" tIns="91440" rIns="91440" bIns="45720" numCol="1" spcCol="0" rtlCol="0" fromWordArt="0" anchor="t" anchorCtr="0" forceAA="0" compatLnSpc="1">
-            <a:prstTxWarp prst="textNoShape">
-              <a:avLst/>
-            </a:prstTxWarp>
-            <a:noAutofit/>
-          </a:bodyPr>
-          <a:lstStyle/>
-          <a:p>
-            <a:pPr algn="l"/>
-            <a:r>
-              <a:rPr lang="en-US" sz="1200" dirty="0">
-                <a:ln w="0"/>
-                <a:solidFill>
-                  <a:srgbClr val="1E8900"/>
-                </a:solidFill>
-                <a:latin typeface="Arial" panose="020B0604020202020204" pitchFamily="34" charset="0"/>
-                <a:cs typeface="Arial" panose="020B0604020202020204" pitchFamily="34" charset="0"/>
-              </a:rPr>
-              <a:t>VPC</a:t>
-            </a:r>
-          </a:p>
-        </p:txBody>
-      </p:sp>
-      <p:sp>
-        <p:nvSpPr>
           <p:cNvPr id="58" name="Rectangle 57">
             <a:extLst>
               <a:ext uri="{FF2B5EF4-FFF2-40B4-BE49-F238E27FC236}">
@@ -4176,7 +4176,7 @@
         </p:nvSpPr>
         <p:spPr>
           <a:xfrm>
-            <a:off x="2247346" y="3258516"/>
+            <a:off x="2170656" y="3261542"/>
             <a:ext cx="1696714" cy="1117932"/>
           </a:xfrm>
           <a:prstGeom prst="rect">
@@ -4500,7 +4500,7 @@
         </p:blipFill>
         <p:spPr>
           <a:xfrm>
-            <a:off x="2252606" y="3265913"/>
+            <a:off x="2168678" y="3261542"/>
             <a:ext cx="274320" cy="274320"/>
           </a:xfrm>
           <a:prstGeom prst="rect">
@@ -7740,6 +7740,551 @@
           </a:extLst>
         </p:spPr>
       </p:pic>
+      <p:cxnSp>
+        <p:nvCxnSpPr>
+          <p:cNvPr id="2" name="Straight Arrow Connector 1">
+            <a:extLst>
+              <a:ext uri="{FF2B5EF4-FFF2-40B4-BE49-F238E27FC236}">
+                <a16:creationId xmlns:a16="http://schemas.microsoft.com/office/drawing/2014/main" id="{3AC1B8EE-73AA-2BD1-78EA-99BBBDFE0A6A}"/>
+              </a:ext>
+            </a:extLst>
+          </p:cNvPr>
+          <p:cNvCxnSpPr>
+            <a:cxnSpLocks/>
+            <a:endCxn id="108" idx="2"/>
+          </p:cNvCxnSpPr>
+          <p:nvPr/>
+        </p:nvCxnSpPr>
+        <p:spPr>
+          <a:xfrm flipV="1">
+            <a:off x="6789483" y="2758607"/>
+            <a:ext cx="0" cy="245850"/>
+          </a:xfrm>
+          <a:prstGeom prst="straightConnector1">
+            <a:avLst/>
+          </a:prstGeom>
+          <a:ln w="12700">
+            <a:solidFill>
+              <a:srgbClr val="545B64"/>
+            </a:solidFill>
+            <a:headEnd type="none" w="med" len="sm"/>
+            <a:tailEnd type="none" w="med" len="sm"/>
+          </a:ln>
+        </p:spPr>
+        <p:style>
+          <a:lnRef idx="1">
+            <a:schemeClr val="accent1"/>
+          </a:lnRef>
+          <a:fillRef idx="0">
+            <a:schemeClr val="accent1"/>
+          </a:fillRef>
+          <a:effectRef idx="0">
+            <a:schemeClr val="accent1"/>
+          </a:effectRef>
+          <a:fontRef idx="minor">
+            <a:schemeClr val="tx1"/>
+          </a:fontRef>
+        </p:style>
+      </p:cxnSp>
+      <p:sp>
+        <p:nvSpPr>
+          <p:cNvPr id="5" name="Freeform 37">
+            <a:extLst>
+              <a:ext uri="{FF2B5EF4-FFF2-40B4-BE49-F238E27FC236}">
+                <a16:creationId xmlns:a16="http://schemas.microsoft.com/office/drawing/2014/main" id="{0C03723B-DFDB-D21D-312D-6D283E753465}"/>
+              </a:ext>
+            </a:extLst>
+          </p:cNvPr>
+          <p:cNvSpPr/>
+          <p:nvPr/>
+        </p:nvSpPr>
+        <p:spPr>
+          <a:xfrm rot="5400000" flipH="1" flipV="1">
+            <a:off x="4775706" y="1248181"/>
+            <a:ext cx="257086" cy="3769636"/>
+          </a:xfrm>
+          <a:custGeom>
+            <a:avLst/>
+            <a:gdLst>
+              <a:gd name="connsiteX0" fmla="*/ 1371600 w 1371600"/>
+              <a:gd name="connsiteY0" fmla="*/ 711200 h 711200"/>
+              <a:gd name="connsiteX1" fmla="*/ 1371600 w 1371600"/>
+              <a:gd name="connsiteY1" fmla="*/ 0 h 711200"/>
+              <a:gd name="connsiteX2" fmla="*/ 0 w 1371600"/>
+              <a:gd name="connsiteY2" fmla="*/ 0 h 711200"/>
+            </a:gdLst>
+            <a:ahLst/>
+            <a:cxnLst>
+              <a:cxn ang="0">
+                <a:pos x="connsiteX0" y="connsiteY0"/>
+              </a:cxn>
+              <a:cxn ang="0">
+                <a:pos x="connsiteX1" y="connsiteY1"/>
+              </a:cxn>
+              <a:cxn ang="0">
+                <a:pos x="connsiteX2" y="connsiteY2"/>
+              </a:cxn>
+            </a:cxnLst>
+            <a:rect l="l" t="t" r="r" b="b"/>
+            <a:pathLst>
+              <a:path w="1371600" h="711200">
+                <a:moveTo>
+                  <a:pt x="1371600" y="711200"/>
+                </a:moveTo>
+                <a:lnTo>
+                  <a:pt x="1371600" y="0"/>
+                </a:lnTo>
+                <a:lnTo>
+                  <a:pt x="0" y="0"/>
+                </a:lnTo>
+              </a:path>
+            </a:pathLst>
+          </a:custGeom>
+          <a:noFill/>
+          <a:ln w="12700">
+            <a:solidFill>
+              <a:schemeClr val="tx2"/>
+            </a:solidFill>
+            <a:headEnd type="none" w="med" len="sm"/>
+            <a:tailEnd type="arrow" w="med" len="sm"/>
+          </a:ln>
+        </p:spPr>
+        <p:style>
+          <a:lnRef idx="2">
+            <a:schemeClr val="accent1">
+              <a:shade val="50000"/>
+            </a:schemeClr>
+          </a:lnRef>
+          <a:fillRef idx="1">
+            <a:schemeClr val="accent1"/>
+          </a:fillRef>
+          <a:effectRef idx="0">
+            <a:schemeClr val="accent1"/>
+          </a:effectRef>
+          <a:fontRef idx="minor">
+            <a:schemeClr val="lt1"/>
+          </a:fontRef>
+        </p:style>
+        <p:txBody>
+          <a:bodyPr anchor="ctr"/>
+          <a:lstStyle/>
+          <a:p>
+            <a:pPr algn="ctr" eaLnBrk="1" fontAlgn="auto" hangingPunct="1">
+              <a:spcBef>
+                <a:spcPts val="0"/>
+              </a:spcBef>
+              <a:spcAft>
+                <a:spcPts val="0"/>
+              </a:spcAft>
+              <a:defRPr/>
+            </a:pPr>
+            <a:endParaRPr lang="en-US" dirty="0"/>
+          </a:p>
+        </p:txBody>
+      </p:sp>
+      <p:cxnSp>
+        <p:nvCxnSpPr>
+          <p:cNvPr id="6" name="Straight Arrow Connector 5">
+            <a:extLst>
+              <a:ext uri="{FF2B5EF4-FFF2-40B4-BE49-F238E27FC236}">
+                <a16:creationId xmlns:a16="http://schemas.microsoft.com/office/drawing/2014/main" id="{BFCEAA51-5347-0F8B-25BC-A118CBEF4E57}"/>
+              </a:ext>
+            </a:extLst>
+          </p:cNvPr>
+          <p:cNvCxnSpPr>
+            <a:cxnSpLocks/>
+            <a:stCxn id="81" idx="0"/>
+          </p:cNvCxnSpPr>
+          <p:nvPr/>
+        </p:nvCxnSpPr>
+        <p:spPr>
+          <a:xfrm flipH="1" flipV="1">
+            <a:off x="4986746" y="3004457"/>
+            <a:ext cx="479" cy="260406"/>
+          </a:xfrm>
+          <a:prstGeom prst="straightConnector1">
+            <a:avLst/>
+          </a:prstGeom>
+          <a:ln w="12700">
+            <a:solidFill>
+              <a:schemeClr val="tx2"/>
+            </a:solidFill>
+            <a:headEnd type="arrow" w="med" len="sm"/>
+            <a:tailEnd type="none" w="med" len="sm"/>
+          </a:ln>
+        </p:spPr>
+        <p:style>
+          <a:lnRef idx="1">
+            <a:schemeClr val="accent1"/>
+          </a:lnRef>
+          <a:fillRef idx="0">
+            <a:schemeClr val="accent1"/>
+          </a:fillRef>
+          <a:effectRef idx="0">
+            <a:schemeClr val="accent1"/>
+          </a:effectRef>
+          <a:fontRef idx="minor">
+            <a:schemeClr val="tx1"/>
+          </a:fontRef>
+        </p:style>
+      </p:cxnSp>
+      <p:sp>
+        <p:nvSpPr>
+          <p:cNvPr id="8" name="Freeform 34">
+            <a:extLst>
+              <a:ext uri="{FF2B5EF4-FFF2-40B4-BE49-F238E27FC236}">
+                <a16:creationId xmlns:a16="http://schemas.microsoft.com/office/drawing/2014/main" id="{404F1DDC-133D-C3B9-C1E2-9C39EF2922B2}"/>
+              </a:ext>
+            </a:extLst>
+          </p:cNvPr>
+          <p:cNvSpPr/>
+          <p:nvPr/>
+        </p:nvSpPr>
+        <p:spPr>
+          <a:xfrm rot="5400000" flipH="1">
+            <a:off x="8568653" y="1218952"/>
+            <a:ext cx="261456" cy="3832463"/>
+          </a:xfrm>
+          <a:custGeom>
+            <a:avLst/>
+            <a:gdLst>
+              <a:gd name="connsiteX0" fmla="*/ 1371600 w 1371600"/>
+              <a:gd name="connsiteY0" fmla="*/ 711200 h 711200"/>
+              <a:gd name="connsiteX1" fmla="*/ 1371600 w 1371600"/>
+              <a:gd name="connsiteY1" fmla="*/ 0 h 711200"/>
+              <a:gd name="connsiteX2" fmla="*/ 0 w 1371600"/>
+              <a:gd name="connsiteY2" fmla="*/ 0 h 711200"/>
+            </a:gdLst>
+            <a:ahLst/>
+            <a:cxnLst>
+              <a:cxn ang="0">
+                <a:pos x="connsiteX0" y="connsiteY0"/>
+              </a:cxn>
+              <a:cxn ang="0">
+                <a:pos x="connsiteX1" y="connsiteY1"/>
+              </a:cxn>
+              <a:cxn ang="0">
+                <a:pos x="connsiteX2" y="connsiteY2"/>
+              </a:cxn>
+            </a:cxnLst>
+            <a:rect l="l" t="t" r="r" b="b"/>
+            <a:pathLst>
+              <a:path w="1371600" h="711200">
+                <a:moveTo>
+                  <a:pt x="1371600" y="711200"/>
+                </a:moveTo>
+                <a:lnTo>
+                  <a:pt x="1371600" y="0"/>
+                </a:lnTo>
+                <a:lnTo>
+                  <a:pt x="0" y="0"/>
+                </a:lnTo>
+              </a:path>
+            </a:pathLst>
+          </a:custGeom>
+          <a:noFill/>
+          <a:ln w="12700">
+            <a:solidFill>
+              <a:schemeClr val="tx2"/>
+            </a:solidFill>
+            <a:headEnd type="none" w="med" len="sm"/>
+            <a:tailEnd type="arrow" w="med" len="sm"/>
+          </a:ln>
+        </p:spPr>
+        <p:style>
+          <a:lnRef idx="2">
+            <a:schemeClr val="accent1">
+              <a:shade val="50000"/>
+            </a:schemeClr>
+          </a:lnRef>
+          <a:fillRef idx="1">
+            <a:schemeClr val="accent1"/>
+          </a:fillRef>
+          <a:effectRef idx="0">
+            <a:schemeClr val="accent1"/>
+          </a:effectRef>
+          <a:fontRef idx="minor">
+            <a:schemeClr val="lt1"/>
+          </a:fontRef>
+        </p:style>
+        <p:txBody>
+          <a:bodyPr anchor="ctr"/>
+          <a:lstStyle/>
+          <a:p>
+            <a:pPr algn="ctr" eaLnBrk="1" fontAlgn="auto" hangingPunct="1">
+              <a:spcBef>
+                <a:spcPts val="0"/>
+              </a:spcBef>
+              <a:spcAft>
+                <a:spcPts val="0"/>
+              </a:spcAft>
+              <a:defRPr/>
+            </a:pPr>
+            <a:endParaRPr lang="en-US" dirty="0"/>
+          </a:p>
+        </p:txBody>
+      </p:sp>
+      <p:cxnSp>
+        <p:nvCxnSpPr>
+          <p:cNvPr id="9" name="Straight Arrow Connector 8">
+            <a:extLst>
+              <a:ext uri="{FF2B5EF4-FFF2-40B4-BE49-F238E27FC236}">
+                <a16:creationId xmlns:a16="http://schemas.microsoft.com/office/drawing/2014/main" id="{4F5F1B23-D80A-2B7D-2246-9DB6008A4759}"/>
+              </a:ext>
+            </a:extLst>
+          </p:cNvPr>
+          <p:cNvCxnSpPr>
+            <a:cxnSpLocks/>
+            <a:stCxn id="82" idx="0"/>
+          </p:cNvCxnSpPr>
+          <p:nvPr/>
+        </p:nvCxnSpPr>
+        <p:spPr>
+          <a:xfrm flipV="1">
+            <a:off x="8612513" y="3004457"/>
+            <a:ext cx="0" cy="260406"/>
+          </a:xfrm>
+          <a:prstGeom prst="straightConnector1">
+            <a:avLst/>
+          </a:prstGeom>
+          <a:ln w="12700">
+            <a:solidFill>
+              <a:schemeClr val="tx2"/>
+            </a:solidFill>
+            <a:headEnd type="arrow" w="med" len="sm"/>
+            <a:tailEnd type="none" w="med" len="sm"/>
+          </a:ln>
+        </p:spPr>
+        <p:style>
+          <a:lnRef idx="1">
+            <a:schemeClr val="accent1"/>
+          </a:lnRef>
+          <a:fillRef idx="0">
+            <a:schemeClr val="accent1"/>
+          </a:fillRef>
+          <a:effectRef idx="0">
+            <a:schemeClr val="accent1"/>
+          </a:effectRef>
+          <a:fontRef idx="minor">
+            <a:schemeClr val="tx1"/>
+          </a:fontRef>
+        </p:style>
+      </p:cxnSp>
+      <p:pic>
+        <p:nvPicPr>
+          <p:cNvPr id="18" name="Graphic 10">
+            <a:extLst>
+              <a:ext uri="{FF2B5EF4-FFF2-40B4-BE49-F238E27FC236}">
+                <a16:creationId xmlns:a16="http://schemas.microsoft.com/office/drawing/2014/main" id="{22A51E96-2227-F073-9D5D-09A53977517D}"/>
+              </a:ext>
+            </a:extLst>
+          </p:cNvPr>
+          <p:cNvPicPr>
+            <a:picLocks noChangeAspect="1" noChangeArrowheads="1"/>
+          </p:cNvPicPr>
+          <p:nvPr/>
+        </p:nvPicPr>
+        <p:blipFill>
+          <a:blip r:embed="rId18">
+            <a:extLst>
+              <a:ext uri="{28A0092B-C50C-407E-A947-70E740481C1C}">
+                <a14:useLocalDpi xmlns:a14="http://schemas.microsoft.com/office/drawing/2010/main" val="0"/>
+              </a:ext>
+            </a:extLst>
+          </a:blip>
+          <a:srcRect/>
+          <a:stretch>
+            <a:fillRect/>
+          </a:stretch>
+        </p:blipFill>
+        <p:spPr bwMode="auto">
+          <a:xfrm>
+            <a:off x="6560465" y="1009796"/>
+            <a:ext cx="457200" cy="457200"/>
+          </a:xfrm>
+          <a:prstGeom prst="rect">
+            <a:avLst/>
+          </a:prstGeom>
+          <a:ln>
+            <a:noFill/>
+          </a:ln>
+        </p:spPr>
+        <p:style>
+          <a:lnRef idx="2">
+            <a:schemeClr val="dk1"/>
+          </a:lnRef>
+          <a:fillRef idx="1">
+            <a:schemeClr val="lt1"/>
+          </a:fillRef>
+          <a:effectRef idx="0">
+            <a:schemeClr val="dk1"/>
+          </a:effectRef>
+          <a:fontRef idx="minor">
+            <a:schemeClr val="dk1"/>
+          </a:fontRef>
+        </p:style>
+      </p:pic>
+      <p:sp>
+        <p:nvSpPr>
+          <p:cNvPr id="19" name="TextBox 12">
+            <a:extLst>
+              <a:ext uri="{FF2B5EF4-FFF2-40B4-BE49-F238E27FC236}">
+                <a16:creationId xmlns:a16="http://schemas.microsoft.com/office/drawing/2014/main" id="{C585FCCB-C967-A4CC-3BFC-D7C17FCD8E3E}"/>
+              </a:ext>
+            </a:extLst>
+          </p:cNvPr>
+          <p:cNvSpPr txBox="1">
+            <a:spLocks noChangeArrowheads="1"/>
+          </p:cNvSpPr>
+          <p:nvPr/>
+        </p:nvSpPr>
+        <p:spPr bwMode="auto">
+          <a:xfrm>
+            <a:off x="6120600" y="1433986"/>
+            <a:ext cx="1403350" cy="261610"/>
+          </a:xfrm>
+          <a:prstGeom prst="rect">
+            <a:avLst/>
+          </a:prstGeom>
+          <a:noFill/>
+          <a:ln>
+            <a:noFill/>
+          </a:ln>
+          <a:extLst>
+            <a:ext uri="{909E8E84-426E-40DD-AFC4-6F175D3DCCD1}">
+              <a14:hiddenFill xmlns:a14="http://schemas.microsoft.com/office/drawing/2010/main">
+                <a:solidFill>
+                  <a:srgbClr val="FFFFFF"/>
+                </a:solidFill>
+              </a14:hiddenFill>
+            </a:ext>
+            <a:ext uri="{91240B29-F687-4F45-9708-019B960494DF}">
+              <a14:hiddenLine xmlns:a14="http://schemas.microsoft.com/office/drawing/2010/main" w="9525">
+                <a:solidFill>
+                  <a:srgbClr val="000000"/>
+                </a:solidFill>
+                <a:miter lim="800000"/>
+                <a:headEnd/>
+                <a:tailEnd/>
+              </a14:hiddenLine>
+            </a:ext>
+          </a:extLst>
+        </p:spPr>
+        <p:txBody>
+          <a:bodyPr>
+            <a:spAutoFit/>
+          </a:bodyPr>
+          <a:lstStyle>
+            <a:lvl1pPr>
+              <a:defRPr>
+                <a:solidFill>
+                  <a:schemeClr val="tx1"/>
+                </a:solidFill>
+                <a:latin typeface="Calibri" panose="020F0502020204030204" pitchFamily="34" charset="0"/>
+              </a:defRPr>
+            </a:lvl1pPr>
+            <a:lvl2pPr marL="742950" indent="-285750">
+              <a:defRPr>
+                <a:solidFill>
+                  <a:schemeClr val="tx1"/>
+                </a:solidFill>
+                <a:latin typeface="Calibri" panose="020F0502020204030204" pitchFamily="34" charset="0"/>
+              </a:defRPr>
+            </a:lvl2pPr>
+            <a:lvl3pPr marL="1143000" indent="-228600">
+              <a:defRPr>
+                <a:solidFill>
+                  <a:schemeClr val="tx1"/>
+                </a:solidFill>
+                <a:latin typeface="Calibri" panose="020F0502020204030204" pitchFamily="34" charset="0"/>
+              </a:defRPr>
+            </a:lvl3pPr>
+            <a:lvl4pPr marL="1600200" indent="-228600">
+              <a:defRPr>
+                <a:solidFill>
+                  <a:schemeClr val="tx1"/>
+                </a:solidFill>
+                <a:latin typeface="Calibri" panose="020F0502020204030204" pitchFamily="34" charset="0"/>
+              </a:defRPr>
+            </a:lvl4pPr>
+            <a:lvl5pPr marL="2057400" indent="-228600">
+              <a:defRPr>
+                <a:solidFill>
+                  <a:schemeClr val="tx1"/>
+                </a:solidFill>
+                <a:latin typeface="Calibri" panose="020F0502020204030204" pitchFamily="34" charset="0"/>
+              </a:defRPr>
+            </a:lvl5pPr>
+            <a:lvl6pPr marL="2514600" indent="-228600" eaLnBrk="0" fontAlgn="base" hangingPunct="0">
+              <a:spcBef>
+                <a:spcPct val="0"/>
+              </a:spcBef>
+              <a:spcAft>
+                <a:spcPct val="0"/>
+              </a:spcAft>
+              <a:defRPr>
+                <a:solidFill>
+                  <a:schemeClr val="tx1"/>
+                </a:solidFill>
+                <a:latin typeface="Calibri" panose="020F0502020204030204" pitchFamily="34" charset="0"/>
+              </a:defRPr>
+            </a:lvl6pPr>
+            <a:lvl7pPr marL="2971800" indent="-228600" eaLnBrk="0" fontAlgn="base" hangingPunct="0">
+              <a:spcBef>
+                <a:spcPct val="0"/>
+              </a:spcBef>
+              <a:spcAft>
+                <a:spcPct val="0"/>
+              </a:spcAft>
+              <a:defRPr>
+                <a:solidFill>
+                  <a:schemeClr val="tx1"/>
+                </a:solidFill>
+                <a:latin typeface="Calibri" panose="020F0502020204030204" pitchFamily="34" charset="0"/>
+              </a:defRPr>
+            </a:lvl7pPr>
+            <a:lvl8pPr marL="3429000" indent="-228600" eaLnBrk="0" fontAlgn="base" hangingPunct="0">
+              <a:spcBef>
+                <a:spcPct val="0"/>
+              </a:spcBef>
+              <a:spcAft>
+                <a:spcPct val="0"/>
+              </a:spcAft>
+              <a:defRPr>
+                <a:solidFill>
+                  <a:schemeClr val="tx1"/>
+                </a:solidFill>
+                <a:latin typeface="Calibri" panose="020F0502020204030204" pitchFamily="34" charset="0"/>
+              </a:defRPr>
+            </a:lvl8pPr>
+            <a:lvl9pPr marL="3886200" indent="-228600" eaLnBrk="0" fontAlgn="base" hangingPunct="0">
+              <a:spcBef>
+                <a:spcPct val="0"/>
+              </a:spcBef>
+              <a:spcAft>
+                <a:spcPct val="0"/>
+              </a:spcAft>
+              <a:defRPr>
+                <a:solidFill>
+                  <a:schemeClr val="tx1"/>
+                </a:solidFill>
+                <a:latin typeface="Calibri" panose="020F0502020204030204" pitchFamily="34" charset="0"/>
+              </a:defRPr>
+            </a:lvl9pPr>
+          </a:lstStyle>
+          <a:p>
+            <a:pPr algn="ctr" eaLnBrk="1" hangingPunct="1"/>
+            <a:r>
+              <a:rPr lang="en-US" altLang="en-US" sz="1100" dirty="0">
+                <a:latin typeface="Arial" panose="020B0604020202020204" pitchFamily="34" charset="0"/>
+                <a:ea typeface="Amazon Ember" panose="020B0603020204020204" pitchFamily="34" charset="0"/>
+                <a:cs typeface="Arial" panose="020B0604020202020204" pitchFamily="34" charset="0"/>
+              </a:rPr>
+              <a:t>Internet gateway</a:t>
+            </a:r>
+          </a:p>
+        </p:txBody>
+      </p:sp>
     </p:spTree>
     <p:extLst>
       <p:ext uri="{BB962C8B-B14F-4D97-AF65-F5344CB8AC3E}">

</xml_diff>